<commit_message>
final modifications to justification and vision.pptx
</commit_message>
<xml_diff>
--- a/final presentation/justification and vision.pptx
+++ b/final presentation/justification and vision.pptx
@@ -3762,6 +3762,38 @@
           <a:chExt cx="0" cy="0"/>
         </a:xfrm>
       </p:grpSpPr>
+      <p:pic>
+        <p:nvPicPr>
+          <p:cNvPr id="6148" name="Picture 4"/>
+          <p:cNvPicPr>
+            <a:picLocks noChangeAspect="1" noChangeArrowheads="1"/>
+          </p:cNvPicPr>
+          <p:nvPr/>
+        </p:nvPicPr>
+        <p:blipFill>
+          <a:blip r:embed="rId2" cstate="print"/>
+          <a:srcRect/>
+          <a:stretch>
+            <a:fillRect/>
+          </a:stretch>
+        </p:blipFill>
+        <p:spPr bwMode="auto">
+          <a:xfrm>
+            <a:off x="6705600" y="0"/>
+            <a:ext cx="1828800" cy="1828800"/>
+          </a:xfrm>
+          <a:prstGeom prst="rect">
+            <a:avLst/>
+          </a:prstGeom>
+          <a:noFill/>
+          <a:ln w="9525">
+            <a:noFill/>
+            <a:miter lim="800000"/>
+            <a:headEnd/>
+            <a:tailEnd/>
+          </a:ln>
+        </p:spPr>
+      </p:pic>
       <p:sp>
         <p:nvSpPr>
           <p:cNvPr id="2" name="Title 1"/>
@@ -3967,10 +3999,15 @@
             <p:ph idx="1"/>
           </p:nvPr>
         </p:nvSpPr>
-        <p:spPr/>
+        <p:spPr>
+          <a:xfrm>
+            <a:off x="457200" y="1600200"/>
+            <a:ext cx="4495800" cy="4525963"/>
+          </a:xfrm>
+        </p:spPr>
         <p:txBody>
           <a:bodyPr>
-            <a:normAutofit fontScale="92500"/>
+            <a:normAutofit/>
           </a:bodyPr>
           <a:lstStyle/>
           <a:p>
@@ -3986,22 +4023,9 @@
           <a:p>
             <a:r>
               <a:rPr lang="en-US" dirty="0" smtClean="0"/>
-              <a:t>John </a:t>
-            </a:r>
-            <a:r>
-              <a:rPr lang="en-US" dirty="0" smtClean="0"/>
-              <a:t>just got his yearly bonus, and wants to see if he can make some money playing the market.</a:t>
-            </a:r>
-          </a:p>
-          <a:p>
-            <a:r>
-              <a:rPr lang="en-US" dirty="0" smtClean="0"/>
-              <a:t>John </a:t>
-            </a:r>
-            <a:r>
-              <a:rPr lang="en-US" dirty="0" smtClean="0"/>
-              <a:t>has a decent understanding of investments and the stock market, but not quite enough experience to make truly educated stock picks.</a:t>
-            </a:r>
+              <a:t>John has some extra capital, and wants to invest</a:t>
+            </a:r>
+            <a:endParaRPr lang="en-US" dirty="0" smtClean="0"/>
           </a:p>
           <a:p>
             <a:r>
@@ -4049,6 +4073,38 @@
           </a:p>
         </p:txBody>
       </p:sp>
+      <p:pic>
+        <p:nvPicPr>
+          <p:cNvPr id="1026" name="Picture 2"/>
+          <p:cNvPicPr>
+            <a:picLocks noChangeAspect="1" noChangeArrowheads="1"/>
+          </p:cNvPicPr>
+          <p:nvPr/>
+        </p:nvPicPr>
+        <p:blipFill>
+          <a:blip r:embed="rId3" cstate="print"/>
+          <a:srcRect/>
+          <a:stretch>
+            <a:fillRect/>
+          </a:stretch>
+        </p:blipFill>
+        <p:spPr bwMode="auto">
+          <a:xfrm>
+            <a:off x="4724400" y="1676400"/>
+            <a:ext cx="3505200" cy="3505200"/>
+          </a:xfrm>
+          <a:prstGeom prst="rect">
+            <a:avLst/>
+          </a:prstGeom>
+          <a:noFill/>
+          <a:ln w="9525">
+            <a:noFill/>
+            <a:miter lim="800000"/>
+            <a:headEnd/>
+            <a:tailEnd/>
+          </a:ln>
+        </p:spPr>
+      </p:pic>
     </p:spTree>
   </p:cSld>
   <p:clrMapOvr>
@@ -4328,6 +4384,38 @@
           </a:p>
         </p:txBody>
       </p:sp>
+      <p:pic>
+        <p:nvPicPr>
+          <p:cNvPr id="3074" name="Picture 2"/>
+          <p:cNvPicPr>
+            <a:picLocks noChangeAspect="1" noChangeArrowheads="1"/>
+          </p:cNvPicPr>
+          <p:nvPr/>
+        </p:nvPicPr>
+        <p:blipFill>
+          <a:blip r:embed="rId2" cstate="print"/>
+          <a:srcRect/>
+          <a:stretch>
+            <a:fillRect/>
+          </a:stretch>
+        </p:blipFill>
+        <p:spPr bwMode="auto">
+          <a:xfrm>
+            <a:off x="7162800" y="381000"/>
+            <a:ext cx="1619250" cy="1619250"/>
+          </a:xfrm>
+          <a:prstGeom prst="rect">
+            <a:avLst/>
+          </a:prstGeom>
+          <a:noFill/>
+          <a:ln w="9525">
+            <a:noFill/>
+            <a:miter lim="800000"/>
+            <a:headEnd/>
+            <a:tailEnd/>
+          </a:ln>
+        </p:spPr>
+      </p:pic>
     </p:spTree>
   </p:cSld>
   <p:clrMapOvr>
@@ -4598,6 +4686,38 @@
           </a:p>
         </p:txBody>
       </p:sp>
+      <p:pic>
+        <p:nvPicPr>
+          <p:cNvPr id="2051" name="Picture 3"/>
+          <p:cNvPicPr>
+            <a:picLocks noChangeAspect="1" noChangeArrowheads="1"/>
+          </p:cNvPicPr>
+          <p:nvPr/>
+        </p:nvPicPr>
+        <p:blipFill>
+          <a:blip r:embed="rId3" cstate="print"/>
+          <a:srcRect/>
+          <a:stretch>
+            <a:fillRect/>
+          </a:stretch>
+        </p:blipFill>
+        <p:spPr bwMode="auto">
+          <a:xfrm>
+            <a:off x="6934200" y="4648200"/>
+            <a:ext cx="1752600" cy="1869440"/>
+          </a:xfrm>
+          <a:prstGeom prst="rect">
+            <a:avLst/>
+          </a:prstGeom>
+          <a:noFill/>
+          <a:ln w="9525">
+            <a:noFill/>
+            <a:miter lim="800000"/>
+            <a:headEnd/>
+            <a:tailEnd/>
+          </a:ln>
+        </p:spPr>
+      </p:pic>
     </p:spTree>
   </p:cSld>
   <p:clrMapOvr>
@@ -5032,6 +5152,38 @@
           </a:p>
         </p:txBody>
       </p:sp>
+      <p:pic>
+        <p:nvPicPr>
+          <p:cNvPr id="4098" name="Picture 2"/>
+          <p:cNvPicPr>
+            <a:picLocks noChangeAspect="1" noChangeArrowheads="1"/>
+          </p:cNvPicPr>
+          <p:nvPr/>
+        </p:nvPicPr>
+        <p:blipFill>
+          <a:blip r:embed="rId2" cstate="print"/>
+          <a:srcRect/>
+          <a:stretch>
+            <a:fillRect/>
+          </a:stretch>
+        </p:blipFill>
+        <p:spPr bwMode="auto">
+          <a:xfrm>
+            <a:off x="6858000" y="4495800"/>
+            <a:ext cx="1162050" cy="1971675"/>
+          </a:xfrm>
+          <a:prstGeom prst="rect">
+            <a:avLst/>
+          </a:prstGeom>
+          <a:noFill/>
+          <a:ln w="9525">
+            <a:noFill/>
+            <a:miter lim="800000"/>
+            <a:headEnd/>
+            <a:tailEnd/>
+          </a:ln>
+        </p:spPr>
+      </p:pic>
     </p:spTree>
   </p:cSld>
   <p:clrMapOvr>
@@ -5140,6 +5292,41 @@
           <a:chExt cx="0" cy="0"/>
         </a:xfrm>
       </p:grpSpPr>
+      <p:pic>
+        <p:nvPicPr>
+          <p:cNvPr id="5122" name="Picture 2"/>
+          <p:cNvPicPr>
+            <a:picLocks noChangeAspect="1" noChangeArrowheads="1"/>
+          </p:cNvPicPr>
+          <p:nvPr/>
+        </p:nvPicPr>
+        <p:blipFill>
+          <a:blip r:embed="rId2" cstate="print">
+            <a:lum/>
+          </a:blip>
+          <a:srcRect/>
+          <a:stretch>
+            <a:fillRect/>
+          </a:stretch>
+        </p:blipFill>
+        <p:spPr bwMode="auto">
+          <a:xfrm>
+            <a:off x="6934200" y="2362200"/>
+            <a:ext cx="2098059" cy="2686050"/>
+          </a:xfrm>
+          <a:prstGeom prst="rect">
+            <a:avLst/>
+          </a:prstGeom>
+          <a:noFill/>
+          <a:ln w="9525">
+            <a:noFill/>
+            <a:miter lim="800000"/>
+            <a:headEnd/>
+            <a:tailEnd/>
+          </a:ln>
+          <a:effectLst/>
+        </p:spPr>
+      </p:pic>
       <p:sp>
         <p:nvSpPr>
           <p:cNvPr id="2" name="Title 1"/>
@@ -5173,9 +5360,16 @@
             <p:ph idx="1"/>
           </p:nvPr>
         </p:nvSpPr>
-        <p:spPr/>
-        <p:txBody>
-          <a:bodyPr/>
+        <p:spPr>
+          <a:xfrm>
+            <a:off x="457200" y="1600200"/>
+            <a:ext cx="6858000" cy="4525963"/>
+          </a:xfrm>
+        </p:spPr>
+        <p:txBody>
+          <a:bodyPr>
+            <a:normAutofit fontScale="92500"/>
+          </a:bodyPr>
           <a:lstStyle/>
           <a:p>
             <a:r>

</xml_diff>